<commit_message>
Some changes on powerpoint and uml
</commit_message>
<xml_diff>
--- a/W1D4Project/Group1.pptx
+++ b/W1D4Project/Group1.pptx
@@ -13327,7 +13327,7 @@
     </p:spTree>
     <p:extLst>
       <p:ext uri="{BB962C8B-B14F-4D97-AF65-F5344CB8AC3E}">
-        <p14:creationId xmlns:p14="http://schemas.microsoft.com/office/powerpoint/2010/main" xmlns="" val="3207719801"/>
+        <p14:creationId xmlns="" xmlns:p14="http://schemas.microsoft.com/office/powerpoint/2010/main" val="3207719801"/>
       </p:ext>
     </p:extLst>
   </p:cSld>
@@ -13441,7 +13441,7 @@
     </p:spTree>
     <p:extLst>
       <p:ext uri="{BB962C8B-B14F-4D97-AF65-F5344CB8AC3E}">
-        <p14:creationId xmlns:p14="http://schemas.microsoft.com/office/powerpoint/2010/main" xmlns="" val="942379934"/>
+        <p14:creationId xmlns="" xmlns:p14="http://schemas.microsoft.com/office/powerpoint/2010/main" val="942379934"/>
       </p:ext>
     </p:extLst>
   </p:cSld>
@@ -13569,7 +13569,7 @@
     </p:spTree>
     <p:extLst>
       <p:ext uri="{BB962C8B-B14F-4D97-AF65-F5344CB8AC3E}">
-        <p14:creationId xmlns:p14="http://schemas.microsoft.com/office/powerpoint/2010/main" xmlns="" val="920628769"/>
+        <p14:creationId xmlns="" xmlns:p14="http://schemas.microsoft.com/office/powerpoint/2010/main" val="920628769"/>
       </p:ext>
     </p:extLst>
   </p:cSld>
@@ -13659,7 +13659,7 @@
     </p:spTree>
     <p:extLst>
       <p:ext uri="{BB962C8B-B14F-4D97-AF65-F5344CB8AC3E}">
-        <p14:creationId xmlns:p14="http://schemas.microsoft.com/office/powerpoint/2010/main" xmlns="" val="525400463"/>
+        <p14:creationId xmlns="" xmlns:p14="http://schemas.microsoft.com/office/powerpoint/2010/main" val="525400463"/>
       </p:ext>
     </p:extLst>
   </p:cSld>
@@ -14088,7 +14088,7 @@
     </p:spTree>
     <p:extLst>
       <p:ext uri="{BB962C8B-B14F-4D97-AF65-F5344CB8AC3E}">
-        <p14:creationId xmlns:p14="http://schemas.microsoft.com/office/powerpoint/2010/main" xmlns="" val="3191090865"/>
+        <p14:creationId xmlns="" xmlns:p14="http://schemas.microsoft.com/office/powerpoint/2010/main" val="3191090865"/>
       </p:ext>
     </p:extLst>
   </p:cSld>
@@ -14170,7 +14170,7 @@
     </p:spTree>
     <p:extLst>
       <p:ext uri="{BB962C8B-B14F-4D97-AF65-F5344CB8AC3E}">
-        <p14:creationId xmlns:p14="http://schemas.microsoft.com/office/powerpoint/2010/main" xmlns="" val="3223958443"/>
+        <p14:creationId xmlns="" xmlns:p14="http://schemas.microsoft.com/office/powerpoint/2010/main" val="3223958443"/>
       </p:ext>
     </p:extLst>
   </p:cSld>
@@ -14237,7 +14237,7 @@
           <a:blip r:embed="rId2">
             <a:extLst>
               <a:ext uri="{28A0092B-C50C-407E-A947-70E740481C1C}">
-                <a14:useLocalDpi xmlns:a14="http://schemas.microsoft.com/office/drawing/2010/main" xmlns="" val="0"/>
+                <a14:useLocalDpi xmlns="" xmlns:a14="http://schemas.microsoft.com/office/drawing/2010/main" val="0"/>
               </a:ext>
             </a:extLst>
           </a:blip>
@@ -14264,7 +14264,7 @@
           <a:blip r:embed="rId2">
             <a:extLst>
               <a:ext uri="{28A0092B-C50C-407E-A947-70E740481C1C}">
-                <a14:useLocalDpi xmlns:a14="http://schemas.microsoft.com/office/drawing/2010/main" xmlns="" val="0"/>
+                <a14:useLocalDpi xmlns="" xmlns:a14="http://schemas.microsoft.com/office/drawing/2010/main" val="0"/>
               </a:ext>
             </a:extLst>
           </a:blip>
@@ -14285,7 +14285,7 @@
     </p:spTree>
     <p:extLst>
       <p:ext uri="{BB962C8B-B14F-4D97-AF65-F5344CB8AC3E}">
-        <p14:creationId xmlns:p14="http://schemas.microsoft.com/office/powerpoint/2010/main" xmlns="" val="502335990"/>
+        <p14:creationId xmlns="" xmlns:p14="http://schemas.microsoft.com/office/powerpoint/2010/main" val="502335990"/>
       </p:ext>
     </p:extLst>
   </p:cSld>
@@ -14352,7 +14352,7 @@
           <a:blip r:embed="rId2">
             <a:extLst>
               <a:ext uri="{28A0092B-C50C-407E-A947-70E740481C1C}">
-                <a14:useLocalDpi xmlns:a14="http://schemas.microsoft.com/office/drawing/2010/main" xmlns="" val="0"/>
+                <a14:useLocalDpi xmlns="" xmlns:a14="http://schemas.microsoft.com/office/drawing/2010/main" val="0"/>
               </a:ext>
             </a:extLst>
           </a:blip>
@@ -14370,7 +14370,7 @@
     </p:spTree>
     <p:extLst>
       <p:ext uri="{BB962C8B-B14F-4D97-AF65-F5344CB8AC3E}">
-        <p14:creationId xmlns:p14="http://schemas.microsoft.com/office/powerpoint/2010/main" xmlns="" val="1313330815"/>
+        <p14:creationId xmlns="" xmlns:p14="http://schemas.microsoft.com/office/powerpoint/2010/main" val="1313330815"/>
       </p:ext>
     </p:extLst>
   </p:cSld>
@@ -14434,28 +14434,22 @@
           </p:nvPr>
         </p:nvPicPr>
         <p:blipFill>
-          <a:blip r:embed="rId2">
-            <a:extLst>
-              <a:ext uri="{28A0092B-C50C-407E-A947-70E740481C1C}">
-                <a14:useLocalDpi xmlns:a14="http://schemas.microsoft.com/office/drawing/2010/main" xmlns="" val="0"/>
-              </a:ext>
-            </a:extLst>
-          </a:blip>
+          <a:blip r:embed="rId2"/>
           <a:stretch>
             <a:fillRect/>
           </a:stretch>
         </p:blipFill>
         <p:spPr>
           <a:xfrm>
-            <a:off x="1804104" y="630827"/>
-            <a:ext cx="10144263" cy="5012146"/>
+            <a:off x="1381125" y="468901"/>
+            <a:ext cx="9338732" cy="6036673"/>
           </a:xfrm>
         </p:spPr>
       </p:pic>
     </p:spTree>
     <p:extLst>
       <p:ext uri="{BB962C8B-B14F-4D97-AF65-F5344CB8AC3E}">
-        <p14:creationId xmlns:p14="http://schemas.microsoft.com/office/powerpoint/2010/main" xmlns="" val="1853764390"/>
+        <p14:creationId xmlns="" xmlns:p14="http://schemas.microsoft.com/office/powerpoint/2010/main" val="1853764390"/>
       </p:ext>
     </p:extLst>
   </p:cSld>
@@ -14537,7 +14531,7 @@
     </p:spTree>
     <p:extLst>
       <p:ext uri="{BB962C8B-B14F-4D97-AF65-F5344CB8AC3E}">
-        <p14:creationId xmlns:p14="http://schemas.microsoft.com/office/powerpoint/2010/main" xmlns="" val="404138280"/>
+        <p14:creationId xmlns="" xmlns:p14="http://schemas.microsoft.com/office/powerpoint/2010/main" val="404138280"/>
       </p:ext>
     </p:extLst>
   </p:cSld>
@@ -14812,7 +14806,7 @@
   <a:extraClrSchemeLst/>
   <a:extLst>
     <a:ext uri="{05A4C25C-085E-4340-85A3-A5531E510DB2}">
-      <thm15:themeFamily xmlns:thm15="http://schemas.microsoft.com/office/thememl/2012/main" xmlns="" name="Ion Boardroom" id="{FC33163D-4339-46B1-8EED-24C834239D99}" vid="{B8502691-933B-45FE-8764-BA278511EF27}"/>
+      <thm15:themeFamily xmlns="" xmlns:thm15="http://schemas.microsoft.com/office/thememl/2012/main" name="Ion Boardroom" id="{FC33163D-4339-46B1-8EED-24C834239D99}" vid="{B8502691-933B-45FE-8764-BA278511EF27}"/>
     </a:ext>
   </a:extLst>
 </a:theme>

</xml_diff>